<commit_message>
added PPT for class
</commit_message>
<xml_diff>
--- a/cassandra-training.pptx
+++ b/cassandra-training.pptx
@@ -1943,7 +1943,7 @@
             <a:fld id="{E30E2307-1E40-4E12-8716-25BFDA8E7013}" type="datetime1">
               <a:rPr lang="en-US" smtClean="0"/>
               <a:pPr/>
-              <a:t>7/14/2013</a:t>
+              <a:t>8/19/2013</a:t>
             </a:fld>
             <a:endParaRPr lang="en-US"/>
           </a:p>
@@ -2126,7 +2126,7 @@
             <a:fld id="{E5CFCF5A-EA79-452C-A52C-1A2668C2E7DF}" type="datetime1">
               <a:rPr lang="en-US" smtClean="0"/>
               <a:pPr/>
-              <a:t>7/14/2013</a:t>
+              <a:t>8/19/2013</a:t>
             </a:fld>
             <a:endParaRPr lang="en-US"/>
           </a:p>
@@ -2279,7 +2279,7 @@
             <a:fld id="{2E5C4C28-BD4B-4892-9A2D-6E19BD753A9A}" type="datetime1">
               <a:rPr lang="en-US" smtClean="0"/>
               <a:pPr/>
-              <a:t>7/14/2013</a:t>
+              <a:t>8/19/2013</a:t>
             </a:fld>
             <a:endParaRPr lang="en-US"/>
           </a:p>
@@ -4107,7 +4107,7 @@
             <a:fld id="{61FD9D02-426E-46C9-9EE9-0DE1EF8B2838}" type="datetime1">
               <a:rPr lang="en-US" smtClean="0"/>
               <a:pPr/>
-              <a:t>7/14/2013</a:t>
+              <a:t>8/19/2013</a:t>
             </a:fld>
             <a:endParaRPr lang="en-US"/>
           </a:p>
@@ -5979,7 +5979,7 @@
             <a:fld id="{7B8AEBBE-F8B2-42CF-9895-E86A608384EB}" type="datetime1">
               <a:rPr lang="en-US" smtClean="0"/>
               <a:pPr/>
-              <a:t>7/14/2013</a:t>
+              <a:t>8/19/2013</a:t>
             </a:fld>
             <a:endParaRPr lang="en-US"/>
           </a:p>
@@ -6094,7 +6094,7 @@
             <a:fld id="{E1FAA6B6-10E5-4810-BC9F-DA72D8452E73}" type="datetime1">
               <a:rPr lang="en-US" smtClean="0"/>
               <a:pPr/>
-              <a:t>7/14/2013</a:t>
+              <a:t>8/19/2013</a:t>
             </a:fld>
             <a:endParaRPr lang="en-US"/>
           </a:p>
@@ -6637,7 +6637,7 @@
             <a:fld id="{6D18D072-EF12-4AA2-BD71-ABC68B06D0E2}" type="datetime1">
               <a:rPr lang="en-US" smtClean="0"/>
               <a:pPr/>
-              <a:t>7/14/2013</a:t>
+              <a:t>8/19/2013</a:t>
             </a:fld>
             <a:endParaRPr lang="en-US"/>
           </a:p>
@@ -6752,7 +6752,7 @@
             <a:fld id="{B8CDBF60-6CC3-4B74-A60D-3486985E4346}" type="datetime1">
               <a:rPr lang="en-US" smtClean="0"/>
               <a:pPr/>
-              <a:t>7/14/2013</a:t>
+              <a:t>8/19/2013</a:t>
             </a:fld>
             <a:endParaRPr lang="en-US"/>
           </a:p>
@@ -8465,7 +8465,7 @@
             <a:fld id="{22714818-984F-4759-BF72-A33BDC1963BD}" type="datetime1">
               <a:rPr lang="en-US" smtClean="0"/>
               <a:pPr/>
-              <a:t>7/14/2013</a:t>
+              <a:t>8/19/2013</a:t>
             </a:fld>
             <a:endParaRPr lang="en-US"/>
           </a:p>
@@ -8618,7 +8618,7 @@
             <a:fld id="{9EA7E191-5F94-4FC1-B823-BD7CABF7FA06}" type="datetime1">
               <a:rPr lang="en-US" smtClean="0"/>
               <a:pPr/>
-              <a:t>7/14/2013</a:t>
+              <a:t>8/19/2013</a:t>
             </a:fld>
             <a:endParaRPr lang="en-US"/>
           </a:p>
@@ -12235,7 +12235,7 @@
             <a:fld id="{88856D55-EFBE-4F9B-8A5F-09D42CA22A9B}" type="datetime1">
               <a:rPr lang="en-US" smtClean="0"/>
               <a:pPr/>
-              <a:t>7/14/2013</a:t>
+              <a:t>8/19/2013</a:t>
             </a:fld>
             <a:endParaRPr lang="en-US"/>
           </a:p>
@@ -14096,7 +14096,7 @@
             <a:fld id="{9D1D110F-3F4E-48D9-B8AA-5D0E825AFDBA}" type="datetime1">
               <a:rPr lang="en-US" smtClean="0"/>
               <a:pPr/>
-              <a:t>7/14/2013</a:t>
+              <a:t>8/19/2013</a:t>
             </a:fld>
             <a:endParaRPr lang="en-US"/>
           </a:p>
@@ -14741,15 +14741,7 @@
           <a:p>
             <a:r>
               <a:rPr lang="en-US" dirty="0" smtClean="0"/>
-              <a:t>Naturally, can map simple entity properties to columns – however more </a:t>
-            </a:r>
-            <a:r>
-              <a:rPr lang="en-US" dirty="0" smtClean="0"/>
-              <a:t>meta-data </a:t>
-            </a:r>
-            <a:r>
-              <a:rPr lang="en-US" dirty="0" smtClean="0"/>
-              <a:t>overhead (Column Names and other meta-data consume space)</a:t>
+              <a:t>Naturally, can map simple entity properties to columns – however more meta-data overhead (Column Names and other meta-data consume space)</a:t>
             </a:r>
           </a:p>
           <a:p>
@@ -14761,11 +14753,7 @@
           <a:p>
             <a:r>
               <a:rPr lang="en-US" dirty="0" smtClean="0"/>
-              <a:t>When defining the schema, make sure to define “key validator” and “column comparator”.  By doing this you can browse your dat</a:t>
-            </a:r>
-            <a:r>
-              <a:rPr lang="en-US" dirty="0" smtClean="0"/>
-              <a:t>a easier using the CLI</a:t>
+              <a:t>When defining the schema, make sure to define “key validator” and “column comparator”.  By doing this you can browse your data easier using the CLI</a:t>
             </a:r>
             <a:endParaRPr lang="en-US" dirty="0"/>
           </a:p>
@@ -16054,10 +16042,6 @@
               </a:rPr>
               <a:t>();</a:t>
             </a:r>
-            <a:endParaRPr lang="en-US" sz="2000" dirty="0">
-              <a:latin typeface="Courier New" pitchFamily="49" charset="0"/>
-              <a:cs typeface="Courier New" pitchFamily="49" charset="0"/>
-            </a:endParaRPr>
           </a:p>
         </p:txBody>
       </p:sp>
@@ -16691,10 +16675,6 @@
               </a:rPr>
               <a:t>());</a:t>
             </a:r>
-            <a:endParaRPr lang="en-US" sz="2000" dirty="0">
-              <a:latin typeface="Courier New" pitchFamily="49" charset="0"/>
-              <a:cs typeface="Courier New" pitchFamily="49" charset="0"/>
-            </a:endParaRPr>
           </a:p>
         </p:txBody>
       </p:sp>
@@ -17264,11 +17244,7 @@
           <a:p>
             <a:r>
               <a:rPr lang="en-US" dirty="0" smtClean="0"/>
-              <a:t>Really not doing anything different than the typical RDMS, except we must manage our </a:t>
-            </a:r>
-            <a:r>
-              <a:rPr lang="en-US" dirty="0" smtClean="0"/>
-              <a:t>own indices</a:t>
+              <a:t>Really not doing anything different than the typical RDMS, except we must manage our own indices</a:t>
             </a:r>
             <a:endParaRPr lang="en-US" dirty="0"/>
           </a:p>
@@ -17398,11 +17374,7 @@
           <a:p>
             <a:r>
               <a:rPr lang="en-US" dirty="0" smtClean="0"/>
-              <a:t>What is </a:t>
-            </a:r>
-            <a:r>
-              <a:rPr lang="en-US" dirty="0" smtClean="0"/>
-              <a:t>Cassandra?</a:t>
+              <a:t>What is Cassandra?</a:t>
             </a:r>
             <a:endParaRPr lang="en-US" dirty="0"/>
           </a:p>
@@ -18441,11 +18413,7 @@
             </a:r>
             <a:r>
               <a:rPr lang="en-US" dirty="0" smtClean="0"/>
-              <a:t>can target specific </a:t>
-            </a:r>
-            <a:r>
-              <a:rPr lang="en-US" dirty="0" smtClean="0"/>
-              <a:t>columns or entire rows</a:t>
+              <a:t>can target specific columns or entire rows</a:t>
             </a:r>
             <a:endParaRPr lang="en-US" dirty="0"/>
           </a:p>
@@ -18805,7 +18773,15 @@
           <a:p>
             <a:r>
               <a:rPr lang="pt-BR" dirty="0"/>
-              <a:t>0 =&gt; 2127 (Random Partitoner)</a:t>
+              <a:t>0 =&gt; 2</a:t>
+            </a:r>
+            <a:r>
+              <a:rPr lang="pt-BR" baseline="30000" dirty="0"/>
+              <a:t>127</a:t>
+            </a:r>
+            <a:r>
+              <a:rPr lang="pt-BR" dirty="0"/>
+              <a:t> (Random Partitoner)</a:t>
             </a:r>
           </a:p>
           <a:p>
@@ -19405,10 +19381,18 @@
           <a:p>
             <a:pPr algn="ctr"/>
             <a:r>
-              <a:rPr lang="en-US"/>
-              <a:t>2127      0</a:t>
-            </a:r>
-            <a:endParaRPr/>
+              <a:rPr lang="en-US" dirty="0"/>
+              <a:t>2</a:t>
+            </a:r>
+            <a:r>
+              <a:rPr lang="en-US" baseline="30000" dirty="0"/>
+              <a:t>127</a:t>
+            </a:r>
+            <a:r>
+              <a:rPr lang="en-US" dirty="0"/>
+              <a:t>      0</a:t>
+            </a:r>
+            <a:endParaRPr dirty="0"/>
           </a:p>
         </p:txBody>
       </p:sp>
@@ -19751,21 +19735,13 @@
           <a:p>
             <a:r>
               <a:rPr lang="en-US" dirty="0" smtClean="0"/>
-              <a:t>Create users</a:t>
-            </a:r>
+              <a:t>Create users, posts, and comments</a:t>
+            </a:r>
+          </a:p>
+          <a:p>
             <a:r>
               <a:rPr lang="en-US" dirty="0" smtClean="0"/>
-              <a:t>, posts, and comments</a:t>
-            </a:r>
-          </a:p>
-          <a:p>
-            <a:r>
-              <a:rPr lang="en-US" dirty="0" smtClean="0"/>
-              <a:t>Retrieve </a:t>
-            </a:r>
-            <a:r>
-              <a:rPr lang="en-US" dirty="0" smtClean="0"/>
-              <a:t>all posts for a user</a:t>
+              <a:t>Retrieve all posts for a user</a:t>
             </a:r>
           </a:p>
           <a:p>
@@ -19777,38 +19753,20 @@
           <a:p>
             <a:r>
               <a:rPr lang="en-US" dirty="0" smtClean="0"/>
-              <a:t>Retrieve </a:t>
-            </a:r>
+              <a:t>Retrieve all comments for a user</a:t>
+            </a:r>
+          </a:p>
+          <a:p>
             <a:r>
               <a:rPr lang="en-US" dirty="0" smtClean="0"/>
-              <a:t>all comments for a user</a:t>
+              <a:t>Retrieve all comments for a post, sorted by vote</a:t>
             </a:r>
           </a:p>
           <a:p>
             <a:r>
               <a:rPr lang="en-US" dirty="0" smtClean="0"/>
-              <a:t>Retrieve all comments for a </a:t>
-            </a:r>
-            <a:r>
-              <a:rPr lang="en-US" dirty="0" smtClean="0"/>
-              <a:t>post, sorted by vote</a:t>
-            </a:r>
-            <a:endParaRPr lang="en-US" dirty="0" smtClean="0"/>
-          </a:p>
-          <a:p>
-            <a:r>
-              <a:rPr lang="en-US" dirty="0" smtClean="0"/>
-              <a:t>Retrieve </a:t>
-            </a:r>
-            <a:r>
-              <a:rPr lang="en-US" dirty="0" smtClean="0"/>
-              <a:t>the top N posts by vote over last </a:t>
-            </a:r>
-            <a:r>
-              <a:rPr lang="en-US" dirty="0" smtClean="0"/>
-              <a:t>30 days</a:t>
-            </a:r>
-            <a:endParaRPr lang="en-US" dirty="0" smtClean="0"/>
+              <a:t>Retrieve the top N posts by vote over last 30 days</a:t>
+            </a:r>
           </a:p>
           <a:p>
             <a:r>

</xml_diff>